<commit_message>
update splashloader und präsentation
</commit_message>
<xml_diff>
--- a/Dokumente/Implementierung/Präsentation/Präsentation.pptx
+++ b/Dokumente/Implementierung/Präsentation/Präsentation.pptx
@@ -3815,7 +3815,7 @@
             <a:pPr algn="ctr"/>
             <a:r>
               <a:rPr lang="de-DE" sz="2800" dirty="0"/>
-              <a:t>300 </a:t>
+              <a:t>312 </a:t>
             </a:r>
             <a:r>
               <a:rPr lang="de-DE" sz="2800" dirty="0" err="1"/>
@@ -3892,7 +3892,7 @@
             <a:pPr algn="ctr"/>
             <a:r>
               <a:rPr lang="de-DE" sz="2800" dirty="0"/>
-              <a:t>20 Pakete</a:t>
+              <a:t>21 Pakete</a:t>
             </a:r>
           </a:p>
         </p:txBody>
@@ -3911,8 +3911,8 @@
         </p:nvSpPr>
         <p:spPr>
           <a:xfrm>
-            <a:off x="7365583" y="5614617"/>
-            <a:ext cx="3611501" cy="523220"/>
+            <a:off x="7319898" y="5614617"/>
+            <a:ext cx="3702873" cy="523220"/>
           </a:xfrm>
           <a:prstGeom prst="rect">
             <a:avLst/>
@@ -3927,12 +3927,8 @@
           <a:p>
             <a:pPr algn="ctr"/>
             <a:r>
-              <a:rPr lang="de-DE" sz="2800"/>
-              <a:t>15000 </a:t>
-            </a:r>
-            <a:r>
               <a:rPr lang="de-DE" sz="2800" dirty="0"/>
-              <a:t>Zeilen Quellcode</a:t>
+              <a:t>20.924 Zeilen Quellcode</a:t>
             </a:r>
           </a:p>
         </p:txBody>

</xml_diff>